<commit_message>
PoI is changed to Stay-location
</commit_message>
<xml_diff>
--- a/4. MotivationPlots/powerpoints/PoI framework.pptx
+++ b/4. MotivationPlots/powerpoints/PoI framework.pptx
@@ -262,7 +262,7 @@
             <a:fld id="{084287E8-CB68-4034-9C63-9DFF91FAFCD3}" type="datetimeFigureOut">
               <a:rPr lang="en-IN" smtClean="0"/>
               <a:pPr/>
-              <a:t>22-02-2021</a:t>
+              <a:t>03-03-2021</a:t>
             </a:fld>
             <a:endParaRPr lang="en-IN"/>
           </a:p>
@@ -464,7 +464,7 @@
             <a:fld id="{084287E8-CB68-4034-9C63-9DFF91FAFCD3}" type="datetimeFigureOut">
               <a:rPr lang="en-IN" smtClean="0"/>
               <a:pPr/>
-              <a:t>22-02-2021</a:t>
+              <a:t>03-03-2021</a:t>
             </a:fld>
             <a:endParaRPr lang="en-IN"/>
           </a:p>
@@ -676,7 +676,7 @@
             <a:fld id="{084287E8-CB68-4034-9C63-9DFF91FAFCD3}" type="datetimeFigureOut">
               <a:rPr lang="en-IN" smtClean="0"/>
               <a:pPr/>
-              <a:t>22-02-2021</a:t>
+              <a:t>03-03-2021</a:t>
             </a:fld>
             <a:endParaRPr lang="en-IN"/>
           </a:p>
@@ -878,7 +878,7 @@
             <a:fld id="{084287E8-CB68-4034-9C63-9DFF91FAFCD3}" type="datetimeFigureOut">
               <a:rPr lang="en-IN" smtClean="0"/>
               <a:pPr/>
-              <a:t>22-02-2021</a:t>
+              <a:t>03-03-2021</a:t>
             </a:fld>
             <a:endParaRPr lang="en-IN"/>
           </a:p>
@@ -1156,7 +1156,7 @@
             <a:fld id="{084287E8-CB68-4034-9C63-9DFF91FAFCD3}" type="datetimeFigureOut">
               <a:rPr lang="en-IN" smtClean="0"/>
               <a:pPr/>
-              <a:t>22-02-2021</a:t>
+              <a:t>03-03-2021</a:t>
             </a:fld>
             <a:endParaRPr lang="en-IN"/>
           </a:p>
@@ -1426,7 +1426,7 @@
             <a:fld id="{084287E8-CB68-4034-9C63-9DFF91FAFCD3}" type="datetimeFigureOut">
               <a:rPr lang="en-IN" smtClean="0"/>
               <a:pPr/>
-              <a:t>22-02-2021</a:t>
+              <a:t>03-03-2021</a:t>
             </a:fld>
             <a:endParaRPr lang="en-IN"/>
           </a:p>
@@ -1843,7 +1843,7 @@
             <a:fld id="{084287E8-CB68-4034-9C63-9DFF91FAFCD3}" type="datetimeFigureOut">
               <a:rPr lang="en-IN" smtClean="0"/>
               <a:pPr/>
-              <a:t>22-02-2021</a:t>
+              <a:t>03-03-2021</a:t>
             </a:fld>
             <a:endParaRPr lang="en-IN"/>
           </a:p>
@@ -1987,7 +1987,7 @@
             <a:fld id="{084287E8-CB68-4034-9C63-9DFF91FAFCD3}" type="datetimeFigureOut">
               <a:rPr lang="en-IN" smtClean="0"/>
               <a:pPr/>
-              <a:t>22-02-2021</a:t>
+              <a:t>03-03-2021</a:t>
             </a:fld>
             <a:endParaRPr lang="en-IN"/>
           </a:p>
@@ -2102,7 +2102,7 @@
             <a:fld id="{084287E8-CB68-4034-9C63-9DFF91FAFCD3}" type="datetimeFigureOut">
               <a:rPr lang="en-IN" smtClean="0"/>
               <a:pPr/>
-              <a:t>22-02-2021</a:t>
+              <a:t>03-03-2021</a:t>
             </a:fld>
             <a:endParaRPr lang="en-IN"/>
           </a:p>
@@ -2417,7 +2417,7 @@
             <a:fld id="{084287E8-CB68-4034-9C63-9DFF91FAFCD3}" type="datetimeFigureOut">
               <a:rPr lang="en-IN" smtClean="0"/>
               <a:pPr/>
-              <a:t>22-02-2021</a:t>
+              <a:t>03-03-2021</a:t>
             </a:fld>
             <a:endParaRPr lang="en-IN"/>
           </a:p>
@@ -2708,7 +2708,7 @@
             <a:fld id="{084287E8-CB68-4034-9C63-9DFF91FAFCD3}" type="datetimeFigureOut">
               <a:rPr lang="en-IN" smtClean="0"/>
               <a:pPr/>
-              <a:t>22-02-2021</a:t>
+              <a:t>03-03-2021</a:t>
             </a:fld>
             <a:endParaRPr lang="en-IN"/>
           </a:p>
@@ -2953,7 +2953,7 @@
             <a:fld id="{084287E8-CB68-4034-9C63-9DFF91FAFCD3}" type="datetimeFigureOut">
               <a:rPr lang="en-IN" smtClean="0"/>
               <a:pPr/>
-              <a:t>22-02-2021</a:t>
+              <a:t>03-03-2021</a:t>
             </a:fld>
             <a:endParaRPr lang="en-IN"/>
           </a:p>
@@ -3570,8 +3570,8 @@
           </p:nvSpPr>
           <p:spPr>
             <a:xfrm rot="16200000">
-              <a:off x="737902" y="1799474"/>
-              <a:ext cx="1416908" cy="297962"/>
+              <a:off x="500059" y="1630991"/>
+              <a:ext cx="1892597" cy="288147"/>
             </a:xfrm>
             <a:prstGeom prst="rect">
               <a:avLst/>
@@ -3586,12 +3586,9 @@
             <a:p>
               <a:r>
                 <a:rPr lang="en-IN" sz="1400" b="1" dirty="0" smtClean="0"/>
-                <a:t>PoI </a:t>
+                <a:t>Stay-location Inference</a:t>
               </a:r>
-              <a:r>
-                <a:rPr lang="en-IN" sz="1400" b="1" dirty="0"/>
-                <a:t>Inferencing</a:t>
-              </a:r>
+              <a:endParaRPr lang="en-IN" sz="1400" b="1" dirty="0"/>
             </a:p>
           </p:txBody>
         </p:sp>
@@ -4243,7 +4240,7 @@
                 <a:pPr algn="ctr"/>
                 <a:r>
                   <a:rPr lang="en-IN" sz="1400" b="1" dirty="0" smtClean="0"/>
-                  <a:t>PoI </a:t>
+                  <a:t>Stay-location </a:t>
                 </a:r>
                 <a:r>
                   <a:rPr lang="en-IN" sz="1400" b="1" dirty="0"/>
@@ -4251,11 +4248,7 @@
                 </a:r>
                 <a:r>
                   <a:rPr lang="en-IN" sz="1400" b="1" dirty="0" smtClean="0"/>
-                  <a:t>agging </a:t>
-                </a:r>
-                <a:r>
-                  <a:rPr lang="en-IN" sz="1400" b="1" dirty="0" smtClean="0"/>
-                  <a:t>Data</a:t>
+                  <a:t>agging Data</a:t>
                 </a:r>
                 <a:endParaRPr lang="en-IN" sz="1400" b="1" dirty="0"/>
               </a:p>
@@ -5032,69 +5025,6 @@
                   </a:p>
                 </p:txBody>
               </p:sp>
-              <p:sp>
-                <p:nvSpPr>
-                  <p:cNvPr id="40" name="Rectangle: Diagonal Corners Rounded 39">
-                    <a:extLst>
-                      <a:ext uri="{FF2B5EF4-FFF2-40B4-BE49-F238E27FC236}">
-                        <a16:creationId xmlns="" xmlns:a16="http://schemas.microsoft.com/office/drawing/2014/main" id="{23C1494D-646B-4ABE-A191-825696EDAAAF}"/>
-                      </a:ext>
-                    </a:extLst>
-                  </p:cNvPr>
-                  <p:cNvSpPr/>
-                  <p:nvPr/>
-                </p:nvSpPr>
-                <p:spPr>
-                  <a:xfrm>
-                    <a:off x="7980883" y="1288841"/>
-                    <a:ext cx="1084938" cy="1504202"/>
-                  </a:xfrm>
-                  <a:prstGeom prst="round2DiagRect">
-                    <a:avLst/>
-                  </a:prstGeom>
-                  <a:solidFill>
-                    <a:schemeClr val="accent2">
-                      <a:lumMod val="20000"/>
-                      <a:lumOff val="80000"/>
-                    </a:schemeClr>
-                  </a:solidFill>
-                  <a:ln w="19050"/>
-                </p:spPr>
-                <p:style>
-                  <a:lnRef idx="1">
-                    <a:schemeClr val="accent5"/>
-                  </a:lnRef>
-                  <a:fillRef idx="2">
-                    <a:schemeClr val="accent5"/>
-                  </a:fillRef>
-                  <a:effectRef idx="1">
-                    <a:schemeClr val="accent5"/>
-                  </a:effectRef>
-                  <a:fontRef idx="minor">
-                    <a:schemeClr val="dk1"/>
-                  </a:fontRef>
-                </p:style>
-                <p:txBody>
-                  <a:bodyPr lIns="36000" tIns="36000" rIns="36000" bIns="36000" rtlCol="0" anchor="ctr" anchorCtr="0"/>
-                  <a:lstStyle/>
-                  <a:p>
-                    <a:pPr algn="ctr"/>
-                    <a:r>
-                      <a:rPr lang="en-IN" sz="1400" b="1" dirty="0" smtClean="0"/>
-                      <a:t>PoI </a:t>
-                    </a:r>
-                    <a:r>
-                      <a:rPr lang="en-IN" sz="1400" b="1" dirty="0"/>
-                      <a:t>I</a:t>
-                    </a:r>
-                    <a:r>
-                      <a:rPr lang="en-IN" sz="1400" b="1" dirty="0" smtClean="0"/>
-                      <a:t>nference</a:t>
-                    </a:r>
-                    <a:endParaRPr lang="en-IN" sz="1400" b="1" dirty="0"/>
-                  </a:p>
-                </p:txBody>
-              </p:sp>
               <p:cxnSp>
                 <p:nvCxnSpPr>
                   <p:cNvPr id="55" name="Connector: Elbow 54">
@@ -5147,6 +5077,61 @@
                   </a:fontRef>
                 </p:style>
               </p:cxnSp>
+              <p:sp>
+                <p:nvSpPr>
+                  <p:cNvPr id="40" name="Rectangle: Diagonal Corners Rounded 39">
+                    <a:extLst>
+                      <a:ext uri="{FF2B5EF4-FFF2-40B4-BE49-F238E27FC236}">
+                        <a16:creationId xmlns="" xmlns:a16="http://schemas.microsoft.com/office/drawing/2014/main" id="{23C1494D-646B-4ABE-A191-825696EDAAAF}"/>
+                      </a:ext>
+                    </a:extLst>
+                  </p:cNvPr>
+                  <p:cNvSpPr/>
+                  <p:nvPr/>
+                </p:nvSpPr>
+                <p:spPr>
+                  <a:xfrm>
+                    <a:off x="7980883" y="1288841"/>
+                    <a:ext cx="1084938" cy="1504202"/>
+                  </a:xfrm>
+                  <a:prstGeom prst="round2DiagRect">
+                    <a:avLst/>
+                  </a:prstGeom>
+                  <a:solidFill>
+                    <a:schemeClr val="accent2">
+                      <a:lumMod val="20000"/>
+                      <a:lumOff val="80000"/>
+                    </a:schemeClr>
+                  </a:solidFill>
+                  <a:ln w="19050"/>
+                </p:spPr>
+                <p:style>
+                  <a:lnRef idx="1">
+                    <a:schemeClr val="accent5"/>
+                  </a:lnRef>
+                  <a:fillRef idx="2">
+                    <a:schemeClr val="accent5"/>
+                  </a:fillRef>
+                  <a:effectRef idx="1">
+                    <a:schemeClr val="accent5"/>
+                  </a:effectRef>
+                  <a:fontRef idx="minor">
+                    <a:schemeClr val="dk1"/>
+                  </a:fontRef>
+                </p:style>
+                <p:txBody>
+                  <a:bodyPr lIns="36000" tIns="36000" rIns="36000" bIns="36000" rtlCol="0" anchor="ctr" anchorCtr="0"/>
+                  <a:lstStyle/>
+                  <a:p>
+                    <a:pPr algn="ctr"/>
+                    <a:r>
+                      <a:rPr lang="en-IN" sz="1400" b="1" dirty="0" smtClean="0"/>
+                      <a:t>Inference</a:t>
+                    </a:r>
+                    <a:endParaRPr lang="en-IN" sz="1400" b="1" dirty="0"/>
+                  </a:p>
+                </p:txBody>
+              </p:sp>
             </p:grpSp>
             <p:sp>
               <p:nvSpPr>
@@ -5487,8 +5472,8 @@
           </p:nvSpPr>
           <p:spPr>
             <a:xfrm>
-              <a:off x="8265367" y="2416601"/>
-              <a:ext cx="1000920" cy="300996"/>
+              <a:off x="8236792" y="2416601"/>
+              <a:ext cx="1035923" cy="300996"/>
             </a:xfrm>
             <a:prstGeom prst="rect">
               <a:avLst/>
@@ -5515,7 +5500,7 @@
               <a:pPr algn="ctr"/>
               <a:r>
                 <a:rPr lang="en-IN" sz="1400" b="1" dirty="0" smtClean="0"/>
-                <a:t>PoI</a:t>
+                <a:t>Stay-location</a:t>
               </a:r>
               <a:endParaRPr lang="en-IN" sz="1400" b="1" dirty="0"/>
             </a:p>
@@ -5726,20 +5711,8 @@
                 <a:p>
                   <a:pPr algn="ctr"/>
                   <a:r>
-                    <a:rPr lang="en-IN" sz="1400" b="1" dirty="0"/>
-                    <a:t>Five </a:t>
-                  </a:r>
-                  <a:r>
                     <a:rPr lang="en-IN" sz="1400" b="1" dirty="0" smtClean="0"/>
-                    <a:t>PoI </a:t>
-                  </a:r>
-                  <a:r>
-                    <a:rPr lang="en-IN" sz="1400" b="1" dirty="0"/>
-                    <a:t>L</a:t>
-                  </a:r>
-                  <a:r>
-                    <a:rPr lang="en-IN" sz="1400" b="1" dirty="0" smtClean="0"/>
-                    <a:t>abels</a:t>
+                    <a:t>Stay-location Labels</a:t>
                   </a:r>
                   <a:endParaRPr lang="en-IN" sz="1400" b="1" dirty="0"/>
                 </a:p>
@@ -6992,16 +6965,13 @@
                 </a:ext>
               </a:extLst>
             </p:cNvPr>
-            <p:cNvCxnSpPr>
-              <a:stCxn id="5" idx="3"/>
-              <a:endCxn id="135" idx="1"/>
-            </p:cNvCxnSpPr>
+            <p:cNvCxnSpPr/>
             <p:nvPr/>
           </p:nvCxnSpPr>
           <p:spPr>
             <a:xfrm flipV="1">
-              <a:off x="8172050" y="1846114"/>
-              <a:ext cx="86818" cy="7531"/>
+              <a:off x="8053515" y="1808014"/>
+              <a:ext cx="272028" cy="7145"/>
             </a:xfrm>
             <a:prstGeom prst="straightConnector1">
               <a:avLst/>
@@ -7046,7 +7016,7 @@
           </p:nvSpPr>
           <p:spPr>
             <a:xfrm>
-              <a:off x="8120445" y="464426"/>
+              <a:off x="8162977" y="464426"/>
               <a:ext cx="1123440" cy="297962"/>
             </a:xfrm>
             <a:prstGeom prst="rect">

</xml_diff>